<commit_message>
feat: add cloud spanner support #16
</commit_message>
<xml_diff>
--- a/sql/docs/Schema to SQL mapping.pptx
+++ b/sql/docs/Schema to SQL mapping.pptx
@@ -7,9 +7,8 @@
   <p:sldIdLst>
     <p:sldId id="256" r:id="rId2"/>
     <p:sldId id="257" r:id="rId3"/>
-    <p:sldId id="258" r:id="rId4"/>
-    <p:sldId id="259" r:id="rId5"/>
-    <p:sldId id="260" r:id="rId6"/>
+    <p:sldId id="259" r:id="rId4"/>
+    <p:sldId id="260" r:id="rId5"/>
   </p:sldIdLst>
   <p:sldSz cx="12192000" cy="6858000"/>
   <p:notesSz cx="6858000" cy="9144000"/>
@@ -263,7 +262,7 @@
           <a:p>
             <a:fld id="{2E9031DC-C975-4EBE-91A0-7CB3CA4CC294}" type="datetimeFigureOut">
               <a:rPr lang="ru-RU" smtClean="0"/>
-              <a:t>03.02.2021</a:t>
+              <a:t>21.04.2021</a:t>
             </a:fld>
             <a:endParaRPr lang="ru-RU"/>
           </a:p>
@@ -461,7 +460,7 @@
           <a:p>
             <a:fld id="{2E9031DC-C975-4EBE-91A0-7CB3CA4CC294}" type="datetimeFigureOut">
               <a:rPr lang="ru-RU" smtClean="0"/>
-              <a:t>03.02.2021</a:t>
+              <a:t>21.04.2021</a:t>
             </a:fld>
             <a:endParaRPr lang="ru-RU"/>
           </a:p>
@@ -669,7 +668,7 @@
           <a:p>
             <a:fld id="{2E9031DC-C975-4EBE-91A0-7CB3CA4CC294}" type="datetimeFigureOut">
               <a:rPr lang="ru-RU" smtClean="0"/>
-              <a:t>03.02.2021</a:t>
+              <a:t>21.04.2021</a:t>
             </a:fld>
             <a:endParaRPr lang="ru-RU"/>
           </a:p>
@@ -867,7 +866,7 @@
           <a:p>
             <a:fld id="{2E9031DC-C975-4EBE-91A0-7CB3CA4CC294}" type="datetimeFigureOut">
               <a:rPr lang="ru-RU" smtClean="0"/>
-              <a:t>03.02.2021</a:t>
+              <a:t>21.04.2021</a:t>
             </a:fld>
             <a:endParaRPr lang="ru-RU"/>
           </a:p>
@@ -1142,7 +1141,7 @@
           <a:p>
             <a:fld id="{2E9031DC-C975-4EBE-91A0-7CB3CA4CC294}" type="datetimeFigureOut">
               <a:rPr lang="ru-RU" smtClean="0"/>
-              <a:t>03.02.2021</a:t>
+              <a:t>21.04.2021</a:t>
             </a:fld>
             <a:endParaRPr lang="ru-RU"/>
           </a:p>
@@ -1407,7 +1406,7 @@
           <a:p>
             <a:fld id="{2E9031DC-C975-4EBE-91A0-7CB3CA4CC294}" type="datetimeFigureOut">
               <a:rPr lang="ru-RU" smtClean="0"/>
-              <a:t>03.02.2021</a:t>
+              <a:t>21.04.2021</a:t>
             </a:fld>
             <a:endParaRPr lang="ru-RU"/>
           </a:p>
@@ -1819,7 +1818,7 @@
           <a:p>
             <a:fld id="{2E9031DC-C975-4EBE-91A0-7CB3CA4CC294}" type="datetimeFigureOut">
               <a:rPr lang="ru-RU" smtClean="0"/>
-              <a:t>03.02.2021</a:t>
+              <a:t>21.04.2021</a:t>
             </a:fld>
             <a:endParaRPr lang="ru-RU"/>
           </a:p>
@@ -1960,7 +1959,7 @@
           <a:p>
             <a:fld id="{2E9031DC-C975-4EBE-91A0-7CB3CA4CC294}" type="datetimeFigureOut">
               <a:rPr lang="ru-RU" smtClean="0"/>
-              <a:t>03.02.2021</a:t>
+              <a:t>21.04.2021</a:t>
             </a:fld>
             <a:endParaRPr lang="ru-RU"/>
           </a:p>
@@ -2073,7 +2072,7 @@
           <a:p>
             <a:fld id="{2E9031DC-C975-4EBE-91A0-7CB3CA4CC294}" type="datetimeFigureOut">
               <a:rPr lang="ru-RU" smtClean="0"/>
-              <a:t>03.02.2021</a:t>
+              <a:t>21.04.2021</a:t>
             </a:fld>
             <a:endParaRPr lang="ru-RU"/>
           </a:p>
@@ -2384,7 +2383,7 @@
           <a:p>
             <a:fld id="{2E9031DC-C975-4EBE-91A0-7CB3CA4CC294}" type="datetimeFigureOut">
               <a:rPr lang="ru-RU" smtClean="0"/>
-              <a:t>03.02.2021</a:t>
+              <a:t>21.04.2021</a:t>
             </a:fld>
             <a:endParaRPr lang="ru-RU"/>
           </a:p>
@@ -2672,7 +2671,7 @@
           <a:p>
             <a:fld id="{2E9031DC-C975-4EBE-91A0-7CB3CA4CC294}" type="datetimeFigureOut">
               <a:rPr lang="ru-RU" smtClean="0"/>
-              <a:t>03.02.2021</a:t>
+              <a:t>21.04.2021</a:t>
             </a:fld>
             <a:endParaRPr lang="ru-RU"/>
           </a:p>
@@ -2913,7 +2912,7 @@
           <a:p>
             <a:fld id="{2E9031DC-C975-4EBE-91A0-7CB3CA4CC294}" type="datetimeFigureOut">
               <a:rPr lang="ru-RU" smtClean="0"/>
-              <a:t>03.02.2021</a:t>
+              <a:t>21.04.2021</a:t>
             </a:fld>
             <a:endParaRPr lang="ru-RU"/>
           </a:p>
@@ -3375,7 +3374,7 @@
           <p:nvPr>
             <p:extLst>
               <p:ext uri="{D42A27DB-BD31-4B8C-83A1-F6EECF244321}">
-                <p14:modId xmlns:p14="http://schemas.microsoft.com/office/powerpoint/2010/main" val="1610334533"/>
+                <p14:modId xmlns:p14="http://schemas.microsoft.com/office/powerpoint/2010/main" val="1921675809"/>
               </p:ext>
             </p:extLst>
           </p:nvPr>
@@ -3553,7 +3552,7 @@
                       </a:pPr>
                       <a:r>
                         <a:rPr lang="en-US" sz="1200" dirty="0"/>
-                        <a:t>VARCHAR(48)</a:t>
+                        <a:t>VARCHAR(64)</a:t>
                       </a:r>
                     </a:p>
                     <a:p>
@@ -4549,7 +4548,7 @@
         <p:spPr>
           <a:xfrm>
             <a:off x="410525" y="757184"/>
-            <a:ext cx="11405653" cy="3693319"/>
+            <a:ext cx="11405653" cy="3139321"/>
           </a:xfrm>
           <a:prstGeom prst="rect">
             <a:avLst/>
@@ -4570,205 +4569,85 @@
           <a:p>
             <a:r>
               <a:rPr lang="en-US" dirty="0"/>
-              <a:t>      "desc": "</a:t>
+              <a:t>  "</a:t>
             </a:r>
             <a:r>
               <a:rPr lang="en-US" dirty="0" err="1"/>
-              <a:t>jans</a:t>
+              <a:t>dat</a:t>
             </a:r>
             <a:r>
               <a:rPr lang="en-US" dirty="0"/>
-              <a:t> user id",</a:t>
+              <a:t>": {</a:t>
             </a:r>
           </a:p>
           <a:p>
             <a:r>
               <a:rPr lang="en-US" dirty="0"/>
-              <a:t>      "equality": "</a:t>
+              <a:t>    "</a:t>
             </a:r>
             <a:r>
               <a:rPr lang="en-US" dirty="0" err="1"/>
-              <a:t>caseIgnoreMatch</a:t>
+              <a:t>mysql</a:t>
             </a:r>
             <a:r>
               <a:rPr lang="en-US" dirty="0"/>
-              <a:t>",</a:t>
+              <a:t>": {</a:t>
             </a:r>
           </a:p>
           <a:p>
             <a:r>
               <a:rPr lang="en-US" dirty="0"/>
-              <a:t>      "names": [</a:t>
+              <a:t>      "type": "TEXT"</a:t>
             </a:r>
           </a:p>
           <a:p>
             <a:r>
               <a:rPr lang="en-US" dirty="0"/>
-              <a:t>        "</a:t>
+              <a:t>    }</a:t>
+            </a:r>
+          </a:p>
+          <a:p>
+            <a:r>
+              <a:rPr lang="en-US" dirty="0"/>
+              <a:t>  },</a:t>
+            </a:r>
+          </a:p>
+          <a:p>
+            <a:r>
+              <a:rPr lang="en-US" dirty="0"/>
+              <a:t>  "description": {</a:t>
+            </a:r>
+          </a:p>
+          <a:p>
+            <a:r>
+              <a:rPr lang="en-US" dirty="0"/>
+              <a:t>    "</a:t>
             </a:r>
             <a:r>
               <a:rPr lang="en-US" dirty="0" err="1"/>
-              <a:t>jansUsrId</a:t>
+              <a:t>mysql</a:t>
             </a:r>
             <a:r>
               <a:rPr lang="en-US" dirty="0"/>
-              <a:t>",</a:t>
+              <a:t>": {</a:t>
             </a:r>
           </a:p>
           <a:p>
             <a:r>
               <a:rPr lang="en-US" dirty="0"/>
-              <a:t>        "</a:t>
-            </a:r>
-            <a:r>
-              <a:rPr lang="en-US" dirty="0" err="1"/>
-              <a:t>usrId</a:t>
-            </a:r>
+              <a:t>      "type": "TEXT"</a:t>
+            </a:r>
+          </a:p>
+          <a:p>
             <a:r>
               <a:rPr lang="en-US" dirty="0"/>
-              <a:t>"</a:t>
+              <a:t>    }</a:t>
             </a:r>
           </a:p>
           <a:p>
             <a:r>
               <a:rPr lang="en-US" dirty="0"/>
-              <a:t>      ],</a:t>
-            </a:r>
-          </a:p>
-          <a:p>
-            <a:r>
-              <a:rPr lang="en-US" dirty="0"/>
-              <a:t>      "</a:t>
-            </a:r>
-            <a:r>
-              <a:rPr lang="en-US" dirty="0" err="1"/>
-              <a:t>oid</a:t>
-            </a:r>
-            <a:r>
-              <a:rPr lang="en-US" dirty="0"/>
-              <a:t>": "</a:t>
-            </a:r>
-            <a:r>
-              <a:rPr lang="en-US" dirty="0" err="1"/>
-              <a:t>jansAttr</a:t>
-            </a:r>
-            <a:r>
-              <a:rPr lang="en-US" dirty="0"/>
-              <a:t>",</a:t>
-            </a:r>
-          </a:p>
-          <a:p>
-            <a:r>
-              <a:rPr lang="en-US" dirty="0"/>
-              <a:t>      "</a:t>
-            </a:r>
-            <a:r>
-              <a:rPr lang="en-US" dirty="0" err="1"/>
-              <a:t>substr</a:t>
-            </a:r>
-            <a:r>
-              <a:rPr lang="en-US" dirty="0"/>
-              <a:t>": "</a:t>
-            </a:r>
-            <a:r>
-              <a:rPr lang="en-US" dirty="0" err="1"/>
-              <a:t>caseIgnoreSubstringsMatch</a:t>
-            </a:r>
-            <a:r>
-              <a:rPr lang="en-US" dirty="0"/>
-              <a:t>",</a:t>
-            </a:r>
-          </a:p>
-          <a:p>
-            <a:r>
-              <a:rPr lang="en-US" dirty="0"/>
-              <a:t>      "syntax": "1.3.6.1.4.1.1466.115.121.1.15",</a:t>
-            </a:r>
-          </a:p>
-          <a:p>
-            <a:r>
-              <a:rPr lang="en-US" dirty="0"/>
-              <a:t>      "</a:t>
-            </a:r>
-            <a:r>
-              <a:rPr lang="en-US" dirty="0" err="1"/>
-              <a:t>x_origin</a:t>
-            </a:r>
-            <a:r>
-              <a:rPr lang="en-US" dirty="0"/>
-              <a:t>": "</a:t>
-            </a:r>
-            <a:r>
-              <a:rPr lang="en-US" dirty="0" err="1"/>
-              <a:t>Jans</a:t>
-            </a:r>
-            <a:r>
-              <a:rPr lang="en-US" dirty="0"/>
-              <a:t> created attribute“,</a:t>
-            </a:r>
-          </a:p>
-          <a:p>
-            <a:r>
-              <a:rPr lang="en-US" dirty="0">
-                <a:solidFill>
-                  <a:srgbClr val="00B050"/>
-                </a:solidFill>
-              </a:rPr>
-              <a:t>      “</a:t>
-            </a:r>
-            <a:r>
-              <a:rPr lang="en-US" dirty="0" err="1">
-                <a:solidFill>
-                  <a:srgbClr val="00B050"/>
-                </a:solidFill>
-              </a:rPr>
-              <a:t>db_data_type</a:t>
-            </a:r>
-            <a:r>
-              <a:rPr lang="en-US" dirty="0">
-                <a:solidFill>
-                  <a:srgbClr val="00B050"/>
-                </a:solidFill>
-              </a:rPr>
-              <a:t>": {“</a:t>
-            </a:r>
-            <a:r>
-              <a:rPr lang="en-US" dirty="0" err="1">
-                <a:solidFill>
-                  <a:srgbClr val="00B050"/>
-                </a:solidFill>
-              </a:rPr>
-              <a:t>db</a:t>
-            </a:r>
-            <a:r>
-              <a:rPr lang="en-US" dirty="0">
-                <a:solidFill>
-                  <a:srgbClr val="00B050"/>
-                </a:solidFill>
-              </a:rPr>
-              <a:t>” : “</a:t>
-            </a:r>
-            <a:r>
-              <a:rPr lang="en-US" dirty="0" err="1">
-                <a:solidFill>
-                  <a:srgbClr val="00B050"/>
-                </a:solidFill>
-              </a:rPr>
-              <a:t>mysql</a:t>
-            </a:r>
-            <a:r>
-              <a:rPr lang="en-US" dirty="0">
-                <a:solidFill>
-                  <a:srgbClr val="00B050"/>
-                </a:solidFill>
-              </a:rPr>
-              <a:t>”, “type” : “VARCHAR”, “size” : 47}</a:t>
-            </a:r>
-          </a:p>
-          <a:p>
-            <a:r>
-              <a:rPr lang="en-US" dirty="0"/>
-              <a:t>    },</a:t>
+              <a:t>  },</a:t>
             </a:r>
           </a:p>
         </p:txBody>
@@ -4806,7 +4685,7 @@
             </a:pPr>
             <a:r>
               <a:rPr lang="en-US" dirty="0"/>
-              <a:t>Default string size is 47.</a:t>
+              <a:t>Default string size is 64.</a:t>
             </a:r>
           </a:p>
           <a:p>
@@ -4823,23 +4702,7 @@
                   <a:srgbClr val="00B050"/>
                 </a:solidFill>
               </a:rPr>
-              <a:t>“</a:t>
-            </a:r>
-            <a:r>
-              <a:rPr lang="en-US" dirty="0" err="1">
-                <a:solidFill>
-                  <a:srgbClr val="00B050"/>
-                </a:solidFill>
-              </a:rPr>
-              <a:t>db_data_type</a:t>
-            </a:r>
-            <a:r>
-              <a:rPr lang="en-US" dirty="0">
-                <a:solidFill>
-                  <a:srgbClr val="00B050"/>
-                </a:solidFill>
-              </a:rPr>
-              <a:t>” </a:t>
+              <a:t>“type” </a:t>
             </a:r>
             <a:r>
               <a:rPr lang="en-US" dirty="0"/>
@@ -4999,233 +4862,6 @@
           <p:cNvPr id="4" name="TextBox 3">
             <a:extLst>
               <a:ext uri="{FF2B5EF4-FFF2-40B4-BE49-F238E27FC236}">
-                <a16:creationId xmlns:a16="http://schemas.microsoft.com/office/drawing/2014/main" id="{CF6B7C92-EC3E-40D5-B9CF-3F8C2E0E7930}"/>
-              </a:ext>
-            </a:extLst>
-          </p:cNvPr>
-          <p:cNvSpPr txBox="1"/>
-          <p:nvPr/>
-        </p:nvSpPr>
-        <p:spPr>
-          <a:xfrm>
-            <a:off x="541538" y="311705"/>
-            <a:ext cx="4642168" cy="369332"/>
-          </a:xfrm>
-          <a:prstGeom prst="rect">
-            <a:avLst/>
-          </a:prstGeom>
-          <a:noFill/>
-        </p:spPr>
-        <p:txBody>
-          <a:bodyPr wrap="none" rtlCol="0">
-            <a:spAutoFit/>
-          </a:bodyPr>
-          <a:lstStyle/>
-          <a:p>
-            <a:r>
-              <a:rPr lang="en-US" dirty="0">
-                <a:solidFill>
-                  <a:srgbClr val="0070C0"/>
-                </a:solidFill>
-              </a:rPr>
-              <a:t>Case when attribute defined in system schema</a:t>
-            </a:r>
-            <a:endParaRPr lang="ru-RU" dirty="0">
-              <a:solidFill>
-                <a:srgbClr val="0070C0"/>
-              </a:solidFill>
-            </a:endParaRPr>
-          </a:p>
-        </p:txBody>
-      </p:sp>
-      <p:sp>
-        <p:nvSpPr>
-          <p:cNvPr id="5" name="TextBox 4">
-            <a:extLst>
-              <a:ext uri="{FF2B5EF4-FFF2-40B4-BE49-F238E27FC236}">
-                <a16:creationId xmlns:a16="http://schemas.microsoft.com/office/drawing/2014/main" id="{D320313F-9FE3-48F5-A71C-8602DAC0AE49}"/>
-              </a:ext>
-            </a:extLst>
-          </p:cNvPr>
-          <p:cNvSpPr txBox="1"/>
-          <p:nvPr/>
-        </p:nvSpPr>
-        <p:spPr>
-          <a:xfrm>
-            <a:off x="410525" y="757184"/>
-            <a:ext cx="11405653" cy="2308324"/>
-          </a:xfrm>
-          <a:prstGeom prst="rect">
-            <a:avLst/>
-          </a:prstGeom>
-          <a:noFill/>
-        </p:spPr>
-        <p:txBody>
-          <a:bodyPr wrap="square">
-            <a:spAutoFit/>
-          </a:bodyPr>
-          <a:lstStyle/>
-          <a:p>
-            <a:r>
-              <a:rPr lang="en-US" dirty="0"/>
-              <a:t> {</a:t>
-            </a:r>
-          </a:p>
-          <a:p>
-            <a:r>
-              <a:rPr lang="en-US" dirty="0"/>
-              <a:t>      "names": [</a:t>
-            </a:r>
-          </a:p>
-          <a:p>
-            <a:r>
-              <a:rPr lang="en-US" dirty="0"/>
-              <a:t>        “</a:t>
-            </a:r>
-            <a:r>
-              <a:rPr lang="en-US" dirty="0" err="1"/>
-              <a:t>userPassword</a:t>
-            </a:r>
-            <a:r>
-              <a:rPr lang="en-US" dirty="0"/>
-              <a:t>"</a:t>
-            </a:r>
-          </a:p>
-          <a:p>
-            <a:r>
-              <a:rPr lang="en-US" dirty="0"/>
-              <a:t>      ],</a:t>
-            </a:r>
-          </a:p>
-          <a:p>
-            <a:r>
-              <a:rPr lang="en-US" dirty="0"/>
-              <a:t>      "syntax": "1.3.6.1.4.1.1466.115.121.1.15",</a:t>
-            </a:r>
-          </a:p>
-          <a:p>
-            <a:r>
-              <a:rPr lang="en-US" dirty="0"/>
-              <a:t>      "</a:t>
-            </a:r>
-            <a:r>
-              <a:rPr lang="en-US" dirty="0" err="1"/>
-              <a:t>x_origin</a:t>
-            </a:r>
-            <a:r>
-              <a:rPr lang="en-US" dirty="0"/>
-              <a:t>": "</a:t>
-            </a:r>
-            <a:r>
-              <a:rPr lang="en-US" dirty="0" err="1"/>
-              <a:t>Jans</a:t>
-            </a:r>
-            <a:r>
-              <a:rPr lang="en-US" dirty="0"/>
-              <a:t> created attribute“,</a:t>
-            </a:r>
-          </a:p>
-          <a:p>
-            <a:r>
-              <a:rPr lang="en-US" dirty="0">
-                <a:solidFill>
-                  <a:srgbClr val="00B050"/>
-                </a:solidFill>
-              </a:rPr>
-              <a:t>      “</a:t>
-            </a:r>
-            <a:r>
-              <a:rPr lang="en-US" dirty="0" err="1">
-                <a:solidFill>
-                  <a:srgbClr val="00B050"/>
-                </a:solidFill>
-              </a:rPr>
-              <a:t>db_data_type</a:t>
-            </a:r>
-            <a:r>
-              <a:rPr lang="en-US" dirty="0">
-                <a:solidFill>
-                  <a:srgbClr val="00B050"/>
-                </a:solidFill>
-              </a:rPr>
-              <a:t>": {“</a:t>
-            </a:r>
-            <a:r>
-              <a:rPr lang="en-US" dirty="0" err="1">
-                <a:solidFill>
-                  <a:srgbClr val="00B050"/>
-                </a:solidFill>
-              </a:rPr>
-              <a:t>db</a:t>
-            </a:r>
-            <a:r>
-              <a:rPr lang="en-US" dirty="0">
-                <a:solidFill>
-                  <a:srgbClr val="00B050"/>
-                </a:solidFill>
-              </a:rPr>
-              <a:t>” : “</a:t>
-            </a:r>
-            <a:r>
-              <a:rPr lang="en-US" dirty="0" err="1">
-                <a:solidFill>
-                  <a:srgbClr val="00B050"/>
-                </a:solidFill>
-              </a:rPr>
-              <a:t>mysql</a:t>
-            </a:r>
-            <a:r>
-              <a:rPr lang="en-US" dirty="0">
-                <a:solidFill>
-                  <a:srgbClr val="00B050"/>
-                </a:solidFill>
-              </a:rPr>
-              <a:t>”, “type” : “VARCHAR”, “size” : 63}</a:t>
-            </a:r>
-          </a:p>
-          <a:p>
-            <a:r>
-              <a:rPr lang="en-US" dirty="0"/>
-              <a:t>    },</a:t>
-            </a:r>
-          </a:p>
-        </p:txBody>
-      </p:sp>
-    </p:spTree>
-    <p:extLst>
-      <p:ext uri="{BB962C8B-B14F-4D97-AF65-F5344CB8AC3E}">
-        <p14:creationId xmlns:p14="http://schemas.microsoft.com/office/powerpoint/2010/main" val="3296106398"/>
-      </p:ext>
-    </p:extLst>
-  </p:cSld>
-  <p:clrMapOvr>
-    <a:masterClrMapping/>
-  </p:clrMapOvr>
-</p:sld>
-</file>
-
-<file path=ppt/slides/slide4.xml><?xml version="1.0" encoding="utf-8"?>
-<p:sld xmlns:a="http://schemas.openxmlformats.org/drawingml/2006/main" xmlns:r="http://schemas.openxmlformats.org/officeDocument/2006/relationships" xmlns:p="http://schemas.openxmlformats.org/presentationml/2006/main">
-  <p:cSld>
-    <p:spTree>
-      <p:nvGrpSpPr>
-        <p:cNvPr id="1" name=""/>
-        <p:cNvGrpSpPr/>
-        <p:nvPr/>
-      </p:nvGrpSpPr>
-      <p:grpSpPr>
-        <a:xfrm>
-          <a:off x="0" y="0"/>
-          <a:ext cx="0" cy="0"/>
-          <a:chOff x="0" y="0"/>
-          <a:chExt cx="0" cy="0"/>
-        </a:xfrm>
-      </p:grpSpPr>
-      <p:sp>
-        <p:nvSpPr>
-          <p:cNvPr id="4" name="TextBox 3">
-            <a:extLst>
-              <a:ext uri="{FF2B5EF4-FFF2-40B4-BE49-F238E27FC236}">
                 <a16:creationId xmlns:a16="http://schemas.microsoft.com/office/drawing/2014/main" id="{27F658F4-C31D-4AFB-99EA-BD8D2654D07F}"/>
               </a:ext>
             </a:extLst>
@@ -5385,7 +5021,7 @@
 </p:sld>
 </file>
 
-<file path=ppt/slides/slide5.xml><?xml version="1.0" encoding="utf-8"?>
+<file path=ppt/slides/slide4.xml><?xml version="1.0" encoding="utf-8"?>
 <p:sld xmlns:a="http://schemas.openxmlformats.org/drawingml/2006/main" xmlns:r="http://schemas.openxmlformats.org/officeDocument/2006/relationships" xmlns:p="http://schemas.openxmlformats.org/presentationml/2006/main">
   <p:cSld>
     <p:spTree>

</xml_diff>